<commit_message>
[modified] msvc2015 빌드 추가
</commit_message>
<xml_diff>
--- a/doc/rtsp_server.pptx
+++ b/doc/rtsp_server.pptx
@@ -120,7 +120,7 @@
   </p:defaultTextStyle>
   <p:extLst>
     <p:ext uri="{EFAFB233-063F-42B5-8137-9DF3F51BA10A}">
-      <p15:sldGuideLst xmlns:p15="http://schemas.microsoft.com/office/powerpoint/2012/main" xmlns=""/>
+      <p15:sldGuideLst xmlns="" xmlns:p15="http://schemas.microsoft.com/office/powerpoint/2012/main"/>
     </p:ext>
   </p:extLst>
 </p:presentation>
@@ -209,7 +209,7 @@
             <a:fld id="{3FF335D5-C6AC-4940-ACA3-D95AF171F83D}" type="datetimeFigureOut">
               <a:rPr lang="en-US" altLang="ko-KR"/>
               <a:pPr/>
-              <a:t>2/19/2017</a:t>
+              <a:t>6/19/2017</a:t>
             </a:fld>
             <a:endParaRPr lang="ko-KR" altLang="en-US"/>
           </a:p>
@@ -862,7 +862,7 @@
             <a:fld id="{2566825D-2B69-4989-8861-A6901ABADB6C}" type="datetimeFigureOut">
               <a:rPr lang="ko-KR" altLang="en-US" smtClean="0"/>
               <a:pPr/>
-              <a:t>2017-02-19</a:t>
+              <a:t>2017-06-19</a:t>
             </a:fld>
             <a:endParaRPr lang="ko-KR" altLang="en-US"/>
           </a:p>
@@ -1032,7 +1032,7 @@
             <a:fld id="{2566825D-2B69-4989-8861-A6901ABADB6C}" type="datetimeFigureOut">
               <a:rPr lang="ko-KR" altLang="en-US" smtClean="0"/>
               <a:pPr/>
-              <a:t>2017-02-19</a:t>
+              <a:t>2017-06-19</a:t>
             </a:fld>
             <a:endParaRPr lang="ko-KR" altLang="en-US"/>
           </a:p>
@@ -1212,7 +1212,7 @@
             <a:fld id="{2566825D-2B69-4989-8861-A6901ABADB6C}" type="datetimeFigureOut">
               <a:rPr lang="ko-KR" altLang="en-US" smtClean="0"/>
               <a:pPr/>
-              <a:t>2017-02-19</a:t>
+              <a:t>2017-06-19</a:t>
             </a:fld>
             <a:endParaRPr lang="ko-KR" altLang="en-US"/>
           </a:p>
@@ -1382,7 +1382,7 @@
             <a:fld id="{2566825D-2B69-4989-8861-A6901ABADB6C}" type="datetimeFigureOut">
               <a:rPr lang="ko-KR" altLang="en-US" smtClean="0"/>
               <a:pPr/>
-              <a:t>2017-02-19</a:t>
+              <a:t>2017-06-19</a:t>
             </a:fld>
             <a:endParaRPr lang="ko-KR" altLang="en-US"/>
           </a:p>
@@ -1629,7 +1629,7 @@
             <a:fld id="{2566825D-2B69-4989-8861-A6901ABADB6C}" type="datetimeFigureOut">
               <a:rPr lang="ko-KR" altLang="en-US" smtClean="0"/>
               <a:pPr/>
-              <a:t>2017-02-19</a:t>
+              <a:t>2017-06-19</a:t>
             </a:fld>
             <a:endParaRPr lang="ko-KR" altLang="en-US"/>
           </a:p>
@@ -1860,7 +1860,7 @@
             <a:fld id="{2566825D-2B69-4989-8861-A6901ABADB6C}" type="datetimeFigureOut">
               <a:rPr lang="ko-KR" altLang="en-US" smtClean="0"/>
               <a:pPr/>
-              <a:t>2017-02-19</a:t>
+              <a:t>2017-06-19</a:t>
             </a:fld>
             <a:endParaRPr lang="ko-KR" altLang="en-US"/>
           </a:p>
@@ -2226,7 +2226,7 @@
             <a:fld id="{2566825D-2B69-4989-8861-A6901ABADB6C}" type="datetimeFigureOut">
               <a:rPr lang="ko-KR" altLang="en-US" smtClean="0"/>
               <a:pPr/>
-              <a:t>2017-02-19</a:t>
+              <a:t>2017-06-19</a:t>
             </a:fld>
             <a:endParaRPr lang="ko-KR" altLang="en-US"/>
           </a:p>
@@ -2345,7 +2345,7 @@
             <a:fld id="{2566825D-2B69-4989-8861-A6901ABADB6C}" type="datetimeFigureOut">
               <a:rPr lang="ko-KR" altLang="en-US" smtClean="0"/>
               <a:pPr/>
-              <a:t>2017-02-19</a:t>
+              <a:t>2017-06-19</a:t>
             </a:fld>
             <a:endParaRPr lang="ko-KR" altLang="en-US"/>
           </a:p>
@@ -2442,7 +2442,7 @@
             <a:fld id="{2566825D-2B69-4989-8861-A6901ABADB6C}" type="datetimeFigureOut">
               <a:rPr lang="ko-KR" altLang="en-US" smtClean="0"/>
               <a:pPr/>
-              <a:t>2017-02-19</a:t>
+              <a:t>2017-06-19</a:t>
             </a:fld>
             <a:endParaRPr lang="ko-KR" altLang="en-US"/>
           </a:p>
@@ -2719,7 +2719,7 @@
             <a:fld id="{2566825D-2B69-4989-8861-A6901ABADB6C}" type="datetimeFigureOut">
               <a:rPr lang="ko-KR" altLang="en-US" smtClean="0"/>
               <a:pPr/>
-              <a:t>2017-02-19</a:t>
+              <a:t>2017-06-19</a:t>
             </a:fld>
             <a:endParaRPr lang="ko-KR" altLang="en-US"/>
           </a:p>
@@ -2973,7 +2973,7 @@
             <a:fld id="{2566825D-2B69-4989-8861-A6901ABADB6C}" type="datetimeFigureOut">
               <a:rPr lang="ko-KR" altLang="en-US" smtClean="0"/>
               <a:pPr/>
-              <a:t>2017-02-19</a:t>
+              <a:t>2017-06-19</a:t>
             </a:fld>
             <a:endParaRPr lang="ko-KR" altLang="en-US"/>
           </a:p>
@@ -3186,7 +3186,7 @@
             <a:fld id="{2566825D-2B69-4989-8861-A6901ABADB6C}" type="datetimeFigureOut">
               <a:rPr lang="ko-KR" altLang="en-US" smtClean="0"/>
               <a:pPr/>
-              <a:t>2017-02-19</a:t>
+              <a:t>2017-06-19</a:t>
             </a:fld>
             <a:endParaRPr lang="ko-KR" altLang="en-US"/>
           </a:p>
@@ -4622,8 +4622,13 @@
             <a:pPr lvl="1"/>
             <a:r>
               <a:rPr lang="en-US" altLang="ko-KR" dirty="0" smtClean="0"/>
-              <a:t>Visual Studio 2008</a:t>
-            </a:r>
+              <a:t>Visual Studio </a:t>
+            </a:r>
+            <a:r>
+              <a:rPr lang="en-US" altLang="ko-KR" dirty="0" smtClean="0"/>
+              <a:t>2008 / 2015</a:t>
+            </a:r>
+            <a:endParaRPr lang="en-US" altLang="ko-KR" dirty="0" smtClean="0"/>
           </a:p>
           <a:p>
             <a:pPr lvl="1"/>
@@ -4655,7 +4660,15 @@
             <a:pPr marL="1371600" lvl="2" indent="-457200"/>
             <a:r>
               <a:rPr lang="en-US" altLang="ko-KR" dirty="0" smtClean="0"/>
-              <a:t>“rtsp_server.exe”</a:t>
+              <a:t>“</a:t>
+            </a:r>
+            <a:r>
+              <a:rPr lang="en-US" altLang="ko-KR" dirty="0" smtClean="0"/>
+              <a:t>rtsp_server_vcxx.exe</a:t>
+            </a:r>
+            <a:r>
+              <a:rPr lang="en-US" altLang="ko-KR" dirty="0" smtClean="0"/>
+              <a:t>”</a:t>
             </a:r>
             <a:r>
               <a:rPr lang="ko-KR" altLang="en-US" dirty="0" smtClean="0"/>
@@ -6029,7 +6042,7 @@
   <a:extraClrSchemeLst/>
   <a:extLst>
     <a:ext uri="{05A4C25C-085E-4340-85A3-A5531E510DB2}">
-      <thm15:themeFamily xmlns:thm15="http://schemas.microsoft.com/office/thememl/2012/main" xmlns="" name="Office Theme" id="{62F939B6-93AF-4DB8-9C6B-D6C7DFDC589F}" vid="{4A3C46E8-61CC-4603-A589-7422A47A8E4A}"/>
+      <thm15:themeFamily xmlns="" xmlns:thm15="http://schemas.microsoft.com/office/thememl/2012/main" name="Office Theme" id="{62F939B6-93AF-4DB8-9C6B-D6C7DFDC589F}" vid="{4A3C46E8-61CC-4603-A589-7422A47A8E4A}"/>
     </a:ext>
   </a:extLst>
 </a:theme>
@@ -6324,7 +6337,7 @@
   <a:extraClrSchemeLst/>
   <a:extLst>
     <a:ext uri="{05A4C25C-085E-4340-85A3-A5531E510DB2}">
-      <thm15:themeFamily xmlns:thm15="http://schemas.microsoft.com/office/thememl/2012/main" xmlns="" name="Office Theme" id="{62F939B6-93AF-4DB8-9C6B-D6C7DFDC589F}" vid="{4A3C46E8-61CC-4603-A589-7422A47A8E4A}"/>
+      <thm15:themeFamily xmlns="" xmlns:thm15="http://schemas.microsoft.com/office/thememl/2012/main" name="Office Theme" id="{62F939B6-93AF-4DB8-9C6B-D6C7DFDC589F}" vid="{4A3C46E8-61CC-4603-A589-7422A47A8E4A}"/>
     </a:ext>
   </a:extLst>
 </a:theme>

</xml_diff>